<commit_message>
Paleta de cores e UserStory
</commit_message>
<xml_diff>
--- a/Documentação/Slides/Apresentação_mineHash.pptx
+++ b/Documentação/Slides/Apresentação_mineHash.pptx
@@ -282,6 +282,35 @@
     </p:ext>
   </p:extLst>
 </p:presentation>
+</file>
+
+<file path=ppt/changesInfos/changesInfo1.xml><?xml version="1.0" encoding="utf-8"?>
+<pc:chgInfo xmlns:a="http://schemas.openxmlformats.org/drawingml/2006/main" xmlns:r="http://schemas.openxmlformats.org/officeDocument/2006/relationships" xmlns:ac="http://schemas.microsoft.com/office/drawing/2013/main/command" xmlns:pc="http://schemas.microsoft.com/office/powerpoint/2013/main/command">
+  <pc:docChgLst>
+    <pc:chgData name="Natalia Medina de Oliveira Juliano" userId="a09039d73e6596b9" providerId="LiveId" clId="{D5F928A2-87FA-476E-96F3-B445C9B4F7B5}"/>
+    <pc:docChg chg="modSld">
+      <pc:chgData name="Natalia Medina de Oliveira Juliano" userId="a09039d73e6596b9" providerId="LiveId" clId="{D5F928A2-87FA-476E-96F3-B445C9B4F7B5}" dt="2019-09-11T21:23:05.142" v="1" actId="20577"/>
+      <pc:docMkLst>
+        <pc:docMk/>
+      </pc:docMkLst>
+      <pc:sldChg chg="modSp">
+        <pc:chgData name="Natalia Medina de Oliveira Juliano" userId="a09039d73e6596b9" providerId="LiveId" clId="{D5F928A2-87FA-476E-96F3-B445C9B4F7B5}" dt="2019-09-11T21:23:05.142" v="1" actId="20577"/>
+        <pc:sldMkLst>
+          <pc:docMk/>
+          <pc:sldMk cId="229736890" sldId="356"/>
+        </pc:sldMkLst>
+        <pc:spChg chg="mod">
+          <ac:chgData name="Natalia Medina de Oliveira Juliano" userId="a09039d73e6596b9" providerId="LiveId" clId="{D5F928A2-87FA-476E-96F3-B445C9B4F7B5}" dt="2019-09-11T21:23:05.142" v="1" actId="20577"/>
+          <ac:spMkLst>
+            <pc:docMk/>
+            <pc:sldMk cId="229736890" sldId="356"/>
+            <ac:spMk id="364" creationId="{00000000-0000-0000-0000-000000000000}"/>
+          </ac:spMkLst>
+        </pc:spChg>
+      </pc:sldChg>
+    </pc:docChg>
+  </pc:docChgLst>
+</pc:chgInfo>
 </file>
 
 <file path=ppt/notesMasters/notesMaster1.xml><?xml version="1.0" encoding="utf-8"?>
@@ -16801,7 +16830,7 @@
                   <a:srgbClr val="FFB600"/>
                 </a:solidFill>
               </a:rPr>
-              <a:t>Obrigada</a:t>
+              <a:t>Obrigado</a:t>
             </a:r>
             <a:r>
               <a:rPr lang="en" sz="9600" dirty="0">

</xml_diff>